<commit_message>
fix bug at function on information
</commit_message>
<xml_diff>
--- a/Presentation.pptx
+++ b/Presentation.pptx
@@ -5540,10 +5540,6 @@
           </p:nvPr>
         </p:nvSpPr>
         <p:spPr>
-          <a:xfrm>
-            <a:off x="844425" y="422500"/>
-            <a:ext cx="3226800" cy="857400"/>
-          </a:xfrm>
           <a:prstGeom prst="rect">
             <a:avLst/>
           </a:prstGeom>
@@ -5595,7 +5591,7 @@
         </p:nvSpPr>
         <p:spPr>
           <a:xfrm>
-            <a:off x="8480584" y="4749851"/>
+            <a:off x="8458200" y="4749900"/>
             <a:ext cx="548700" cy="393600"/>
           </a:xfrm>
           <a:prstGeom prst="rect">
@@ -5642,7 +5638,7 @@
         </p:nvSpPr>
         <p:spPr>
           <a:xfrm>
-            <a:off x="304800" y="2038350"/>
+            <a:off x="0" y="2038350"/>
             <a:ext cx="1143000" cy="914400"/>
           </a:xfrm>
           <a:prstGeom prst="ellipse">
@@ -6036,8 +6032,8 @@
         </p:nvCxnSpPr>
         <p:spPr>
           <a:xfrm>
-            <a:off x="1447800" y="2495550"/>
-            <a:ext cx="457200" cy="0"/>
+            <a:off x="1143000" y="2495550"/>
+            <a:ext cx="762000" cy="0"/>
           </a:xfrm>
           <a:prstGeom prst="straightConnector1">
             <a:avLst/>
@@ -6461,6 +6457,253 @@
           </a:sp3d>
         </p:spPr>
       </p:pic>
+      <p:sp>
+        <p:nvSpPr>
+          <p:cNvPr id="21" name="TextBox 20"/>
+          <p:cNvSpPr txBox="1"/>
+          <p:nvPr/>
+        </p:nvSpPr>
+        <p:spPr>
+          <a:xfrm>
+            <a:off x="3276600" y="2343150"/>
+            <a:ext cx="314510" cy="307777"/>
+          </a:xfrm>
+          <a:prstGeom prst="rect">
+            <a:avLst/>
+          </a:prstGeom>
+          <a:noFill/>
+        </p:spPr>
+        <p:txBody>
+          <a:bodyPr wrap="none" rtlCol="0">
+            <a:spAutoFit/>
+          </a:bodyPr>
+          <a:lstStyle/>
+          <a:p>
+            <a:r>
+              <a:rPr lang="en-US" dirty="0" smtClean="0">
+                <a:solidFill>
+                  <a:srgbClr val="FF0000"/>
+                </a:solidFill>
+              </a:rPr>
+              <a:t>Đ</a:t>
+            </a:r>
+            <a:endParaRPr lang="en-US" dirty="0">
+              <a:solidFill>
+                <a:srgbClr val="FF0000"/>
+              </a:solidFill>
+            </a:endParaRPr>
+          </a:p>
+        </p:txBody>
+      </p:sp>
+      <p:sp>
+        <p:nvSpPr>
+          <p:cNvPr id="22" name="TextBox 21"/>
+          <p:cNvSpPr txBox="1"/>
+          <p:nvPr/>
+        </p:nvSpPr>
+        <p:spPr>
+          <a:xfrm>
+            <a:off x="2362200" y="3181350"/>
+            <a:ext cx="304892" cy="307777"/>
+          </a:xfrm>
+          <a:prstGeom prst="rect">
+            <a:avLst/>
+          </a:prstGeom>
+          <a:noFill/>
+        </p:spPr>
+        <p:txBody>
+          <a:bodyPr wrap="none" rtlCol="0">
+            <a:spAutoFit/>
+          </a:bodyPr>
+          <a:lstStyle/>
+          <a:p>
+            <a:r>
+              <a:rPr lang="en-US" dirty="0" smtClean="0">
+                <a:solidFill>
+                  <a:srgbClr val="FF0000"/>
+                </a:solidFill>
+              </a:rPr>
+              <a:t>S</a:t>
+            </a:r>
+            <a:endParaRPr lang="en-US" dirty="0">
+              <a:solidFill>
+                <a:srgbClr val="FF0000"/>
+              </a:solidFill>
+            </a:endParaRPr>
+          </a:p>
+        </p:txBody>
+      </p:sp>
+      <p:sp>
+        <p:nvSpPr>
+          <p:cNvPr id="23" name="TextBox 22"/>
+          <p:cNvSpPr txBox="1"/>
+          <p:nvPr/>
+        </p:nvSpPr>
+        <p:spPr>
+          <a:xfrm>
+            <a:off x="7162800" y="2343150"/>
+            <a:ext cx="314510" cy="307777"/>
+          </a:xfrm>
+          <a:prstGeom prst="rect">
+            <a:avLst/>
+          </a:prstGeom>
+          <a:noFill/>
+        </p:spPr>
+        <p:txBody>
+          <a:bodyPr wrap="none" rtlCol="0">
+            <a:spAutoFit/>
+          </a:bodyPr>
+          <a:lstStyle/>
+          <a:p>
+            <a:r>
+              <a:rPr lang="en-US" dirty="0" smtClean="0">
+                <a:solidFill>
+                  <a:srgbClr val="FF0000"/>
+                </a:solidFill>
+              </a:rPr>
+              <a:t>Đ</a:t>
+            </a:r>
+            <a:endParaRPr lang="en-US" dirty="0">
+              <a:solidFill>
+                <a:srgbClr val="FF0000"/>
+              </a:solidFill>
+            </a:endParaRPr>
+          </a:p>
+        </p:txBody>
+      </p:sp>
+      <p:sp>
+        <p:nvSpPr>
+          <p:cNvPr id="24" name="TextBox 23"/>
+          <p:cNvSpPr txBox="1"/>
+          <p:nvPr/>
+        </p:nvSpPr>
+        <p:spPr>
+          <a:xfrm>
+            <a:off x="6172200" y="3105150"/>
+            <a:ext cx="304892" cy="307777"/>
+          </a:xfrm>
+          <a:prstGeom prst="rect">
+            <a:avLst/>
+          </a:prstGeom>
+          <a:noFill/>
+        </p:spPr>
+        <p:txBody>
+          <a:bodyPr wrap="none" rtlCol="0">
+            <a:spAutoFit/>
+          </a:bodyPr>
+          <a:lstStyle/>
+          <a:p>
+            <a:r>
+              <a:rPr lang="en-US" dirty="0" smtClean="0">
+                <a:solidFill>
+                  <a:srgbClr val="FF0000"/>
+                </a:solidFill>
+              </a:rPr>
+              <a:t>S</a:t>
+            </a:r>
+            <a:endParaRPr lang="en-US" dirty="0">
+              <a:solidFill>
+                <a:srgbClr val="FF0000"/>
+              </a:solidFill>
+            </a:endParaRPr>
+          </a:p>
+        </p:txBody>
+      </p:sp>
+      <p:cxnSp>
+        <p:nvCxnSpPr>
+          <p:cNvPr id="37" name="Straight Connector 36"/>
+          <p:cNvCxnSpPr>
+            <a:stCxn id="12" idx="4"/>
+          </p:cNvCxnSpPr>
+          <p:nvPr/>
+        </p:nvCxnSpPr>
+        <p:spPr>
+          <a:xfrm>
+            <a:off x="8305800" y="4400550"/>
+            <a:ext cx="0" cy="381000"/>
+          </a:xfrm>
+          <a:prstGeom prst="line">
+            <a:avLst/>
+          </a:prstGeom>
+        </p:spPr>
+        <p:style>
+          <a:lnRef idx="2">
+            <a:schemeClr val="accent4"/>
+          </a:lnRef>
+          <a:fillRef idx="0">
+            <a:schemeClr val="accent4"/>
+          </a:fillRef>
+          <a:effectRef idx="1">
+            <a:schemeClr val="accent4"/>
+          </a:effectRef>
+          <a:fontRef idx="minor">
+            <a:schemeClr val="tx1"/>
+          </a:fontRef>
+        </p:style>
+      </p:cxnSp>
+      <p:cxnSp>
+        <p:nvCxnSpPr>
+          <p:cNvPr id="39" name="Straight Connector 38"/>
+          <p:cNvCxnSpPr/>
+          <p:nvPr/>
+        </p:nvCxnSpPr>
+        <p:spPr>
+          <a:xfrm flipH="1">
+            <a:off x="457200" y="4781550"/>
+            <a:ext cx="7848600" cy="0"/>
+          </a:xfrm>
+          <a:prstGeom prst="line">
+            <a:avLst/>
+          </a:prstGeom>
+        </p:spPr>
+        <p:style>
+          <a:lnRef idx="2">
+            <a:schemeClr val="accent4"/>
+          </a:lnRef>
+          <a:fillRef idx="0">
+            <a:schemeClr val="accent4"/>
+          </a:fillRef>
+          <a:effectRef idx="1">
+            <a:schemeClr val="accent4"/>
+          </a:effectRef>
+          <a:fontRef idx="minor">
+            <a:schemeClr val="tx1"/>
+          </a:fontRef>
+        </p:style>
+      </p:cxnSp>
+      <p:cxnSp>
+        <p:nvCxnSpPr>
+          <p:cNvPr id="41" name="Straight Arrow Connector 40"/>
+          <p:cNvCxnSpPr/>
+          <p:nvPr/>
+        </p:nvCxnSpPr>
+        <p:spPr>
+          <a:xfrm flipV="1">
+            <a:off x="457200" y="2876550"/>
+            <a:ext cx="0" cy="1905000"/>
+          </a:xfrm>
+          <a:prstGeom prst="straightConnector1">
+            <a:avLst/>
+          </a:prstGeom>
+          <a:ln>
+            <a:tailEnd type="arrow"/>
+          </a:ln>
+        </p:spPr>
+        <p:style>
+          <a:lnRef idx="2">
+            <a:schemeClr val="accent4"/>
+          </a:lnRef>
+          <a:fillRef idx="0">
+            <a:schemeClr val="accent4"/>
+          </a:fillRef>
+          <a:effectRef idx="1">
+            <a:schemeClr val="accent4"/>
+          </a:effectRef>
+          <a:fontRef idx="minor">
+            <a:schemeClr val="tx1"/>
+          </a:fontRef>
+        </p:style>
+      </p:cxnSp>
     </p:spTree>
   </p:cSld>
   <p:clrMapOvr>
@@ -6594,7 +6837,7 @@
         <p:spPr>
           <a:xfrm>
             <a:off x="838200" y="1657350"/>
-            <a:ext cx="5971500" cy="2438400"/>
+            <a:ext cx="7543800" cy="2438400"/>
           </a:xfrm>
           <a:ln>
             <a:solidFill>
@@ -6611,16 +6854,22 @@
                 <a:solidFill>
                   <a:schemeClr val="tx1"/>
                 </a:solidFill>
-              </a:rPr>
-              <a:t>https://</a:t>
-            </a:r>
+                <a:latin typeface="Times New Roman" pitchFamily="18" charset="0"/>
+                <a:cs typeface="Times New Roman" pitchFamily="18" charset="0"/>
+              </a:rPr>
+              <a:t>https://github.com/chandrikadeb7/Face-Mask-Detection</a:t>
+            </a:r>
+          </a:p>
+          <a:p>
             <a:r>
               <a:rPr lang="en-US" dirty="0" smtClean="0">
                 <a:solidFill>
                   <a:schemeClr val="tx1"/>
                 </a:solidFill>
-              </a:rPr>
-              <a:t>github.com/chandrikadeb7/Face-Mask-Detection</a:t>
+                <a:latin typeface="Times New Roman" pitchFamily="18" charset="0"/>
+                <a:cs typeface="Times New Roman" pitchFamily="18" charset="0"/>
+              </a:rPr>
+              <a:t>https://reactjs.org/</a:t>
             </a:r>
           </a:p>
           <a:p>
@@ -6629,16 +6878,22 @@
                 <a:solidFill>
                   <a:schemeClr val="tx1"/>
                 </a:solidFill>
-              </a:rPr>
-              <a:t>https://reactjs.org</a:t>
-            </a:r>
+                <a:latin typeface="Times New Roman" pitchFamily="18" charset="0"/>
+                <a:cs typeface="Times New Roman" pitchFamily="18" charset="0"/>
+              </a:rPr>
+              <a:t>https://material-ui.com/</a:t>
+            </a:r>
+          </a:p>
+          <a:p>
             <a:r>
               <a:rPr lang="en-US" dirty="0" smtClean="0">
                 <a:solidFill>
                   <a:schemeClr val="tx1"/>
                 </a:solidFill>
-              </a:rPr>
-              <a:t>/</a:t>
+                <a:latin typeface="Times New Roman" pitchFamily="18" charset="0"/>
+                <a:cs typeface="Times New Roman" pitchFamily="18" charset="0"/>
+              </a:rPr>
+              <a:t>https://flask.palletsprojects.com/en/1.1.x/</a:t>
             </a:r>
           </a:p>
           <a:p>
@@ -6647,39 +6902,8 @@
                 <a:solidFill>
                   <a:schemeClr val="tx1"/>
                 </a:solidFill>
-              </a:rPr>
-              <a:t>https://material-ui.com</a:t>
-            </a:r>
-            <a:r>
-              <a:rPr lang="en-US" dirty="0" smtClean="0">
-                <a:solidFill>
-                  <a:schemeClr val="tx1"/>
-                </a:solidFill>
-              </a:rPr>
-              <a:t>/</a:t>
-            </a:r>
-          </a:p>
-          <a:p>
-            <a:r>
-              <a:rPr lang="en-US" dirty="0" smtClean="0">
-                <a:solidFill>
-                  <a:schemeClr val="tx1"/>
-                </a:solidFill>
-              </a:rPr>
-              <a:t>https://flask.palletsprojects.com/en/1.1.x/</a:t>
-            </a:r>
-            <a:endParaRPr lang="en-US" dirty="0" smtClean="0">
-              <a:solidFill>
-                <a:schemeClr val="tx1"/>
-              </a:solidFill>
-            </a:endParaRPr>
-          </a:p>
-          <a:p>
-            <a:r>
-              <a:rPr lang="en-US" dirty="0" smtClean="0">
-                <a:solidFill>
-                  <a:schemeClr val="tx1"/>
-                </a:solidFill>
+                <a:latin typeface="Times New Roman" pitchFamily="18" charset="0"/>
+                <a:cs typeface="Times New Roman" pitchFamily="18" charset="0"/>
               </a:rPr>
               <a:t>…</a:t>
             </a:r>
@@ -6687,6 +6911,8 @@
               <a:solidFill>
                 <a:schemeClr val="tx1"/>
               </a:solidFill>
+              <a:latin typeface="Times New Roman" pitchFamily="18" charset="0"/>
+              <a:cs typeface="Times New Roman" pitchFamily="18" charset="0"/>
             </a:endParaRPr>
           </a:p>
         </p:txBody>
@@ -6814,6 +7040,53 @@
       </p:grpSpPr>
       <p:sp>
         <p:nvSpPr>
+          <p:cNvPr id="332" name="Google Shape;332;p39"/>
+          <p:cNvSpPr txBox="1">
+            <a:spLocks noGrp="1"/>
+          </p:cNvSpPr>
+          <p:nvPr>
+            <p:ph type="sldNum" idx="12"/>
+          </p:nvPr>
+        </p:nvSpPr>
+        <p:spPr>
+          <a:prstGeom prst="rect">
+            <a:avLst/>
+          </a:prstGeom>
+        </p:spPr>
+        <p:txBody>
+          <a:bodyPr spcFirstLastPara="1" wrap="square" lIns="91425" tIns="91425" rIns="91425" bIns="91425" anchor="t" anchorCtr="0">
+            <a:noAutofit/>
+          </a:bodyPr>
+          <a:lstStyle/>
+          <a:p>
+            <a:pPr marL="0" lvl="0" indent="0" algn="r" rtl="0">
+              <a:spcBef>
+                <a:spcPts val="0"/>
+              </a:spcBef>
+              <a:spcAft>
+                <a:spcPts val="0"/>
+              </a:spcAft>
+              <a:buNone/>
+            </a:pPr>
+            <a:fld id="{00000000-1234-1234-1234-123412341234}" type="slidenum">
+              <a:rPr lang="en"/>
+              <a:pPr marL="0" lvl="0" indent="0" algn="r" rtl="0">
+                <a:spcBef>
+                  <a:spcPts val="0"/>
+                </a:spcBef>
+                <a:spcAft>
+                  <a:spcPts val="0"/>
+                </a:spcAft>
+                <a:buNone/>
+              </a:pPr>
+              <a:t>12</a:t>
+            </a:fld>
+            <a:endParaRPr/>
+          </a:p>
+        </p:txBody>
+      </p:sp>
+      <p:sp>
+        <p:nvSpPr>
           <p:cNvPr id="329" name="Google Shape;329;p39"/>
           <p:cNvSpPr txBox="1">
             <a:spLocks noGrp="1"/>
@@ -6824,8 +7097,8 @@
         </p:nvSpPr>
         <p:spPr>
           <a:xfrm>
-            <a:off x="2361750" y="1357900"/>
-            <a:ext cx="4674900" cy="1159800"/>
+            <a:off x="4468813" y="1357313"/>
+            <a:ext cx="4675187" cy="1160462"/>
           </a:xfrm>
           <a:prstGeom prst="rect">
             <a:avLst/>
@@ -6878,8 +7151,8 @@
         </p:nvSpPr>
         <p:spPr>
           <a:xfrm>
-            <a:off x="2380675" y="2775675"/>
-            <a:ext cx="4631400" cy="939075"/>
+            <a:off x="4513263" y="2774950"/>
+            <a:ext cx="4630737" cy="939800"/>
           </a:xfrm>
           <a:prstGeom prst="rect">
             <a:avLst/>
@@ -6913,57 +7186,6 @@
                 <a:srgbClr val="000000"/>
               </a:solidFill>
             </a:endParaRPr>
-          </a:p>
-        </p:txBody>
-      </p:sp>
-      <p:sp>
-        <p:nvSpPr>
-          <p:cNvPr id="332" name="Google Shape;332;p39"/>
-          <p:cNvSpPr txBox="1">
-            <a:spLocks noGrp="1"/>
-          </p:cNvSpPr>
-          <p:nvPr>
-            <p:ph type="sldNum" idx="12"/>
-          </p:nvPr>
-        </p:nvSpPr>
-        <p:spPr>
-          <a:xfrm>
-            <a:off x="8480584" y="4749851"/>
-            <a:ext cx="548700" cy="393600"/>
-          </a:xfrm>
-          <a:prstGeom prst="rect">
-            <a:avLst/>
-          </a:prstGeom>
-        </p:spPr>
-        <p:txBody>
-          <a:bodyPr spcFirstLastPara="1" wrap="square" lIns="91425" tIns="91425" rIns="91425" bIns="91425" anchor="t" anchorCtr="0">
-            <a:noAutofit/>
-          </a:bodyPr>
-          <a:lstStyle/>
-          <a:p>
-            <a:pPr marL="0" lvl="0" indent="0" algn="r" rtl="0">
-              <a:spcBef>
-                <a:spcPts val="0"/>
-              </a:spcBef>
-              <a:spcAft>
-                <a:spcPts val="0"/>
-              </a:spcAft>
-              <a:buNone/>
-            </a:pPr>
-            <a:fld id="{00000000-1234-1234-1234-123412341234}" type="slidenum">
-              <a:rPr lang="en"/>
-              <a:pPr marL="0" lvl="0" indent="0" algn="r" rtl="0">
-                <a:spcBef>
-                  <a:spcPts val="0"/>
-                </a:spcBef>
-                <a:spcAft>
-                  <a:spcPts val="0"/>
-                </a:spcAft>
-                <a:buNone/>
-              </a:pPr>
-              <a:t>12</a:t>
-            </a:fld>
-            <a:endParaRPr/>
           </a:p>
         </p:txBody>
       </p:sp>
@@ -7098,6 +7320,53 @@
       </p:grpSpPr>
       <p:sp>
         <p:nvSpPr>
+          <p:cNvPr id="96" name="Google Shape;96;p17"/>
+          <p:cNvSpPr txBox="1">
+            <a:spLocks noGrp="1"/>
+          </p:cNvSpPr>
+          <p:nvPr>
+            <p:ph type="sldNum" idx="12"/>
+          </p:nvPr>
+        </p:nvSpPr>
+        <p:spPr>
+          <a:prstGeom prst="rect">
+            <a:avLst/>
+          </a:prstGeom>
+        </p:spPr>
+        <p:txBody>
+          <a:bodyPr spcFirstLastPara="1" wrap="square" lIns="91425" tIns="91425" rIns="91425" bIns="91425" anchor="t" anchorCtr="0">
+            <a:noAutofit/>
+          </a:bodyPr>
+          <a:lstStyle/>
+          <a:p>
+            <a:pPr marL="0" lvl="0" indent="0" algn="r" rtl="0">
+              <a:spcBef>
+                <a:spcPts val="0"/>
+              </a:spcBef>
+              <a:spcAft>
+                <a:spcPts val="0"/>
+              </a:spcAft>
+              <a:buNone/>
+            </a:pPr>
+            <a:fld id="{00000000-1234-1234-1234-123412341234}" type="slidenum">
+              <a:rPr lang="en"/>
+              <a:pPr marL="0" lvl="0" indent="0" algn="r" rtl="0">
+                <a:spcBef>
+                  <a:spcPts val="0"/>
+                </a:spcBef>
+                <a:spcAft>
+                  <a:spcPts val="0"/>
+                </a:spcAft>
+                <a:buNone/>
+              </a:pPr>
+              <a:t>2</a:t>
+            </a:fld>
+            <a:endParaRPr/>
+          </a:p>
+        </p:txBody>
+      </p:sp>
+      <p:sp>
+        <p:nvSpPr>
           <p:cNvPr id="93" name="Google Shape;93;p17"/>
           <p:cNvSpPr txBox="1">
             <a:spLocks noGrp="1"/>
@@ -7108,8 +7377,8 @@
         </p:nvSpPr>
         <p:spPr>
           <a:xfrm>
-            <a:off x="2361750" y="1357900"/>
-            <a:ext cx="5791650" cy="1159800"/>
+            <a:off x="3352800" y="1357313"/>
+            <a:ext cx="5791200" cy="1160462"/>
           </a:xfrm>
           <a:prstGeom prst="rect">
             <a:avLst/>
@@ -7182,8 +7451,8 @@
         </p:nvSpPr>
         <p:spPr>
           <a:xfrm>
-            <a:off x="2362200" y="3181350"/>
-            <a:ext cx="5239325" cy="2243400"/>
+            <a:off x="3905250" y="3181350"/>
+            <a:ext cx="5238750" cy="2243138"/>
           </a:xfrm>
           <a:prstGeom prst="rect">
             <a:avLst/>
@@ -7297,57 +7566,6 @@
                 <a:srgbClr val="000000"/>
               </a:solidFill>
             </a:endParaRPr>
-          </a:p>
-        </p:txBody>
-      </p:sp>
-      <p:sp>
-        <p:nvSpPr>
-          <p:cNvPr id="96" name="Google Shape;96;p17"/>
-          <p:cNvSpPr txBox="1">
-            <a:spLocks noGrp="1"/>
-          </p:cNvSpPr>
-          <p:nvPr>
-            <p:ph type="sldNum" idx="12"/>
-          </p:nvPr>
-        </p:nvSpPr>
-        <p:spPr>
-          <a:xfrm>
-            <a:off x="8480584" y="4749851"/>
-            <a:ext cx="548700" cy="393600"/>
-          </a:xfrm>
-          <a:prstGeom prst="rect">
-            <a:avLst/>
-          </a:prstGeom>
-        </p:spPr>
-        <p:txBody>
-          <a:bodyPr spcFirstLastPara="1" wrap="square" lIns="91425" tIns="91425" rIns="91425" bIns="91425" anchor="t" anchorCtr="0">
-            <a:noAutofit/>
-          </a:bodyPr>
-          <a:lstStyle/>
-          <a:p>
-            <a:pPr marL="0" lvl="0" indent="0" algn="r" rtl="0">
-              <a:spcBef>
-                <a:spcPts val="0"/>
-              </a:spcBef>
-              <a:spcAft>
-                <a:spcPts val="0"/>
-              </a:spcAft>
-              <a:buNone/>
-            </a:pPr>
-            <a:fld id="{00000000-1234-1234-1234-123412341234}" type="slidenum">
-              <a:rPr lang="en"/>
-              <a:pPr marL="0" lvl="0" indent="0" algn="r" rtl="0">
-                <a:spcBef>
-                  <a:spcPts val="0"/>
-                </a:spcBef>
-                <a:spcAft>
-                  <a:spcPts val="0"/>
-                </a:spcAft>
-                <a:buNone/>
-              </a:pPr>
-              <a:t>2</a:t>
-            </a:fld>
-            <a:endParaRPr/>
           </a:p>
         </p:txBody>
       </p:sp>
@@ -8100,10 +8318,6 @@
           </p:nvPr>
         </p:nvSpPr>
         <p:spPr>
-          <a:xfrm>
-            <a:off x="8480584" y="4749851"/>
-            <a:ext cx="548700" cy="393600"/>
-          </a:xfrm>
           <a:prstGeom prst="rect">
             <a:avLst/>
           </a:prstGeom>
@@ -8222,6 +8436,96 @@
       </p:grpSpPr>
       <p:sp>
         <p:nvSpPr>
+          <p:cNvPr id="137" name="Google Shape;137;p22"/>
+          <p:cNvSpPr txBox="1">
+            <a:spLocks noGrp="1"/>
+          </p:cNvSpPr>
+          <p:nvPr>
+            <p:ph type="title"/>
+          </p:nvPr>
+        </p:nvSpPr>
+        <p:spPr>
+          <a:prstGeom prst="rect">
+            <a:avLst/>
+          </a:prstGeom>
+        </p:spPr>
+        <p:txBody>
+          <a:bodyPr spcFirstLastPara="1" wrap="square" lIns="91425" tIns="91425" rIns="91425" bIns="91425" anchor="t" anchorCtr="0">
+            <a:noAutofit/>
+          </a:bodyPr>
+          <a:lstStyle/>
+          <a:p>
+            <a:pPr marL="0" lvl="0" indent="0" algn="l" rtl="0">
+              <a:spcBef>
+                <a:spcPts val="0"/>
+              </a:spcBef>
+              <a:spcAft>
+                <a:spcPts val="0"/>
+              </a:spcAft>
+              <a:buNone/>
+            </a:pPr>
+            <a:r>
+              <a:rPr lang="en-US" dirty="0" err="1" smtClean="0">
+                <a:solidFill>
+                  <a:srgbClr val="FF004E"/>
+                </a:solidFill>
+                <a:latin typeface="Times New Roman" pitchFamily="18" charset="0"/>
+                <a:cs typeface="Times New Roman" pitchFamily="18" charset="0"/>
+              </a:rPr>
+              <a:t>Đặt</a:t>
+            </a:r>
+            <a:r>
+              <a:rPr lang="en-US" dirty="0" smtClean="0">
+                <a:solidFill>
+                  <a:srgbClr val="FF004E"/>
+                </a:solidFill>
+                <a:latin typeface="Times New Roman" pitchFamily="18" charset="0"/>
+                <a:cs typeface="Times New Roman" pitchFamily="18" charset="0"/>
+              </a:rPr>
+              <a:t> </a:t>
+            </a:r>
+            <a:r>
+              <a:rPr lang="en-US" dirty="0" err="1" smtClean="0">
+                <a:solidFill>
+                  <a:srgbClr val="FF004E"/>
+                </a:solidFill>
+                <a:latin typeface="Times New Roman" pitchFamily="18" charset="0"/>
+                <a:cs typeface="Times New Roman" pitchFamily="18" charset="0"/>
+              </a:rPr>
+              <a:t>vấn</a:t>
+            </a:r>
+            <a:r>
+              <a:rPr lang="en-US" dirty="0" smtClean="0">
+                <a:solidFill>
+                  <a:srgbClr val="FF004E"/>
+                </a:solidFill>
+                <a:latin typeface="Times New Roman" pitchFamily="18" charset="0"/>
+                <a:cs typeface="Times New Roman" pitchFamily="18" charset="0"/>
+              </a:rPr>
+              <a:t> </a:t>
+            </a:r>
+            <a:r>
+              <a:rPr lang="en-US" dirty="0" err="1" smtClean="0">
+                <a:solidFill>
+                  <a:srgbClr val="FF004E"/>
+                </a:solidFill>
+                <a:latin typeface="Times New Roman" pitchFamily="18" charset="0"/>
+                <a:cs typeface="Times New Roman" pitchFamily="18" charset="0"/>
+              </a:rPr>
+              <a:t>đề</a:t>
+            </a:r>
+            <a:endParaRPr dirty="0">
+              <a:solidFill>
+                <a:srgbClr val="FF004E"/>
+              </a:solidFill>
+              <a:latin typeface="Times New Roman" pitchFamily="18" charset="0"/>
+              <a:cs typeface="Times New Roman" pitchFamily="18" charset="0"/>
+            </a:endParaRPr>
+          </a:p>
+        </p:txBody>
+      </p:sp>
+      <p:sp>
+        <p:nvSpPr>
           <p:cNvPr id="136" name="Google Shape;136;p22"/>
           <p:cNvSpPr txBox="1">
             <a:spLocks noGrp="1"/>
@@ -8530,7 +8834,14 @@
                 <a:latin typeface="Times New Roman" pitchFamily="18" charset="0"/>
                 <a:cs typeface="Times New Roman" pitchFamily="18" charset="0"/>
               </a:rPr>
-              <a:t> 11 </a:t>
+              <a:t> </a:t>
+            </a:r>
+            <a:r>
+              <a:rPr lang="en-US" dirty="0" smtClean="0">
+                <a:latin typeface="Times New Roman" pitchFamily="18" charset="0"/>
+                <a:cs typeface="Times New Roman" pitchFamily="18" charset="0"/>
+              </a:rPr>
+              <a:t>14 </a:t>
             </a:r>
             <a:r>
               <a:rPr lang="en-US" dirty="0" err="1" smtClean="0">
@@ -8568,100 +8879,6 @@
               <a:t>nhiễm</a:t>
             </a:r>
             <a:endParaRPr dirty="0">
-              <a:latin typeface="Times New Roman" pitchFamily="18" charset="0"/>
-              <a:cs typeface="Times New Roman" pitchFamily="18" charset="0"/>
-            </a:endParaRPr>
-          </a:p>
-        </p:txBody>
-      </p:sp>
-      <p:sp>
-        <p:nvSpPr>
-          <p:cNvPr id="137" name="Google Shape;137;p22"/>
-          <p:cNvSpPr txBox="1">
-            <a:spLocks noGrp="1"/>
-          </p:cNvSpPr>
-          <p:nvPr>
-            <p:ph type="title"/>
-          </p:nvPr>
-        </p:nvSpPr>
-        <p:spPr>
-          <a:xfrm>
-            <a:off x="844425" y="422500"/>
-            <a:ext cx="3226800" cy="857400"/>
-          </a:xfrm>
-          <a:prstGeom prst="rect">
-            <a:avLst/>
-          </a:prstGeom>
-        </p:spPr>
-        <p:txBody>
-          <a:bodyPr spcFirstLastPara="1" wrap="square" lIns="91425" tIns="91425" rIns="91425" bIns="91425" anchor="t" anchorCtr="0">
-            <a:noAutofit/>
-          </a:bodyPr>
-          <a:lstStyle/>
-          <a:p>
-            <a:pPr marL="0" lvl="0" indent="0" algn="l" rtl="0">
-              <a:spcBef>
-                <a:spcPts val="0"/>
-              </a:spcBef>
-              <a:spcAft>
-                <a:spcPts val="0"/>
-              </a:spcAft>
-              <a:buNone/>
-            </a:pPr>
-            <a:r>
-              <a:rPr lang="en-US" dirty="0" err="1" smtClean="0">
-                <a:solidFill>
-                  <a:srgbClr val="FF004E"/>
-                </a:solidFill>
-                <a:latin typeface="Times New Roman" pitchFamily="18" charset="0"/>
-                <a:cs typeface="Times New Roman" pitchFamily="18" charset="0"/>
-              </a:rPr>
-              <a:t>Đặt</a:t>
-            </a:r>
-            <a:r>
-              <a:rPr lang="en-US" dirty="0" smtClean="0">
-                <a:solidFill>
-                  <a:srgbClr val="FF004E"/>
-                </a:solidFill>
-                <a:latin typeface="Times New Roman" pitchFamily="18" charset="0"/>
-                <a:cs typeface="Times New Roman" pitchFamily="18" charset="0"/>
-              </a:rPr>
-              <a:t> </a:t>
-            </a:r>
-            <a:r>
-              <a:rPr lang="en-US" dirty="0" err="1" smtClean="0">
-                <a:solidFill>
-                  <a:srgbClr val="FF004E"/>
-                </a:solidFill>
-                <a:latin typeface="Times New Roman" pitchFamily="18" charset="0"/>
-                <a:cs typeface="Times New Roman" pitchFamily="18" charset="0"/>
-              </a:rPr>
-              <a:t>vấn</a:t>
-            </a:r>
-            <a:r>
-              <a:rPr lang="en-US" dirty="0" smtClean="0">
-                <a:solidFill>
-                  <a:srgbClr val="FF004E"/>
-                </a:solidFill>
-                <a:latin typeface="Times New Roman" pitchFamily="18" charset="0"/>
-                <a:cs typeface="Times New Roman" pitchFamily="18" charset="0"/>
-              </a:rPr>
-              <a:t> </a:t>
-            </a:r>
-            <a:r>
-              <a:rPr lang="en-US" dirty="0" err="1" smtClean="0">
-                <a:solidFill>
-                  <a:srgbClr val="FF004E"/>
-                </a:solidFill>
-                <a:latin typeface="Times New Roman" pitchFamily="18" charset="0"/>
-                <a:cs typeface="Times New Roman" pitchFamily="18" charset="0"/>
-              </a:rPr>
-              <a:t>đề</a:t>
-            </a:r>
-            <a:endParaRPr dirty="0">
-              <a:solidFill>
-                <a:srgbClr val="FF004E"/>
-              </a:solidFill>
               <a:latin typeface="Times New Roman" pitchFamily="18" charset="0"/>
               <a:cs typeface="Times New Roman" pitchFamily="18" charset="0"/>
             </a:endParaRPr>
@@ -8971,6 +9188,118 @@
               </a:rPr>
               <a:t>kém</a:t>
             </a:r>
+            <a:r>
+              <a:rPr lang="en-US" dirty="0" smtClean="0">
+                <a:latin typeface="Times New Roman" pitchFamily="18" charset="0"/>
+                <a:cs typeface="Times New Roman" pitchFamily="18" charset="0"/>
+              </a:rPr>
+              <a:t> </a:t>
+            </a:r>
+            <a:r>
+              <a:rPr lang="en-US" dirty="0" err="1" smtClean="0">
+                <a:latin typeface="Times New Roman" pitchFamily="18" charset="0"/>
+                <a:cs typeface="Times New Roman" pitchFamily="18" charset="0"/>
+              </a:rPr>
+              <a:t>trong</a:t>
+            </a:r>
+            <a:r>
+              <a:rPr lang="en-US" dirty="0" smtClean="0">
+                <a:latin typeface="Times New Roman" pitchFamily="18" charset="0"/>
+                <a:cs typeface="Times New Roman" pitchFamily="18" charset="0"/>
+              </a:rPr>
+              <a:t> </a:t>
+            </a:r>
+            <a:r>
+              <a:rPr lang="en-US" dirty="0" err="1" smtClean="0">
+                <a:latin typeface="Times New Roman" pitchFamily="18" charset="0"/>
+                <a:cs typeface="Times New Roman" pitchFamily="18" charset="0"/>
+              </a:rPr>
+              <a:t>việc</a:t>
+            </a:r>
+            <a:r>
+              <a:rPr lang="en-US" dirty="0" smtClean="0">
+                <a:latin typeface="Times New Roman" pitchFamily="18" charset="0"/>
+                <a:cs typeface="Times New Roman" pitchFamily="18" charset="0"/>
+              </a:rPr>
+              <a:t> </a:t>
+            </a:r>
+            <a:r>
+              <a:rPr lang="en-US" dirty="0" err="1" smtClean="0">
+                <a:latin typeface="Times New Roman" pitchFamily="18" charset="0"/>
+                <a:cs typeface="Times New Roman" pitchFamily="18" charset="0"/>
+              </a:rPr>
+              <a:t>đeo</a:t>
+            </a:r>
+            <a:r>
+              <a:rPr lang="en-US" dirty="0" smtClean="0">
+                <a:latin typeface="Times New Roman" pitchFamily="18" charset="0"/>
+                <a:cs typeface="Times New Roman" pitchFamily="18" charset="0"/>
+              </a:rPr>
+              <a:t> </a:t>
+            </a:r>
+            <a:r>
+              <a:rPr lang="en-US" dirty="0" err="1" smtClean="0">
+                <a:latin typeface="Times New Roman" pitchFamily="18" charset="0"/>
+                <a:cs typeface="Times New Roman" pitchFamily="18" charset="0"/>
+              </a:rPr>
+              <a:t>khẩu</a:t>
+            </a:r>
+            <a:r>
+              <a:rPr lang="en-US" dirty="0" smtClean="0">
+                <a:latin typeface="Times New Roman" pitchFamily="18" charset="0"/>
+                <a:cs typeface="Times New Roman" pitchFamily="18" charset="0"/>
+              </a:rPr>
+              <a:t> </a:t>
+            </a:r>
+            <a:r>
+              <a:rPr lang="en-US" dirty="0" err="1" smtClean="0">
+                <a:latin typeface="Times New Roman" pitchFamily="18" charset="0"/>
+                <a:cs typeface="Times New Roman" pitchFamily="18" charset="0"/>
+              </a:rPr>
+              <a:t>trang</a:t>
+            </a:r>
+            <a:r>
+              <a:rPr lang="en-US" dirty="0" smtClean="0">
+                <a:latin typeface="Times New Roman" pitchFamily="18" charset="0"/>
+                <a:cs typeface="Times New Roman" pitchFamily="18" charset="0"/>
+              </a:rPr>
+              <a:t> ở </a:t>
+            </a:r>
+            <a:r>
+              <a:rPr lang="en-US" dirty="0" err="1" smtClean="0">
+                <a:latin typeface="Times New Roman" pitchFamily="18" charset="0"/>
+                <a:cs typeface="Times New Roman" pitchFamily="18" charset="0"/>
+              </a:rPr>
+              <a:t>nơi</a:t>
+            </a:r>
+            <a:r>
+              <a:rPr lang="en-US" dirty="0" smtClean="0">
+                <a:latin typeface="Times New Roman" pitchFamily="18" charset="0"/>
+                <a:cs typeface="Times New Roman" pitchFamily="18" charset="0"/>
+              </a:rPr>
+              <a:t> </a:t>
+            </a:r>
+            <a:r>
+              <a:rPr lang="en-US" dirty="0" err="1" smtClean="0">
+                <a:latin typeface="Times New Roman" pitchFamily="18" charset="0"/>
+                <a:cs typeface="Times New Roman" pitchFamily="18" charset="0"/>
+              </a:rPr>
+              <a:t>công</a:t>
+            </a:r>
+            <a:r>
+              <a:rPr lang="en-US" dirty="0" smtClean="0">
+                <a:latin typeface="Times New Roman" pitchFamily="18" charset="0"/>
+                <a:cs typeface="Times New Roman" pitchFamily="18" charset="0"/>
+              </a:rPr>
+              <a:t> </a:t>
+            </a:r>
+            <a:r>
+              <a:rPr lang="en-US" dirty="0" err="1" smtClean="0">
+                <a:latin typeface="Times New Roman" pitchFamily="18" charset="0"/>
+                <a:cs typeface="Times New Roman" pitchFamily="18" charset="0"/>
+              </a:rPr>
+              <a:t>cộng</a:t>
+            </a:r>
             <a:endParaRPr dirty="0">
               <a:latin typeface="Times New Roman" pitchFamily="18" charset="0"/>
               <a:cs typeface="Times New Roman" pitchFamily="18" charset="0"/>
@@ -8989,10 +9318,6 @@
           </p:nvPr>
         </p:nvSpPr>
         <p:spPr>
-          <a:xfrm>
-            <a:off x="8480584" y="4749851"/>
-            <a:ext cx="548700" cy="393600"/>
-          </a:xfrm>
           <a:prstGeom prst="rect">
             <a:avLst/>
           </a:prstGeom>
@@ -10558,6 +10883,12 @@
               <a:buChar char="-"/>
             </a:pPr>
             <a:r>
+              <a:rPr lang="en-US" sz="1600" dirty="0" smtClean="0">
+                <a:latin typeface="+mj-lt"/>
+              </a:rPr>
+              <a:t> </a:t>
+            </a:r>
+            <a:r>
               <a:rPr lang="vi-VN" sz="1600" dirty="0" smtClean="0">
                 <a:latin typeface="+mj-lt"/>
               </a:rPr>
@@ -10700,60 +11031,74 @@
               <a:buChar char="-"/>
             </a:pPr>
             <a:r>
+              <a:rPr lang="en-US" sz="1600" smtClean="0">
+                <a:latin typeface="Times New Roman" pitchFamily="18" charset="0"/>
+                <a:cs typeface="Times New Roman" pitchFamily="18" charset="0"/>
+              </a:rPr>
+              <a:t> </a:t>
+            </a:r>
+            <a:r>
+              <a:rPr lang="en-US" sz="1600" smtClean="0">
+                <a:latin typeface="Times New Roman" pitchFamily="18" charset="0"/>
+                <a:cs typeface="Times New Roman" pitchFamily="18" charset="0"/>
+              </a:rPr>
+              <a:t>CNN </a:t>
+            </a:r>
+            <a:r>
               <a:rPr lang="en-US" sz="1600" dirty="0" smtClean="0">
                 <a:latin typeface="Times New Roman" pitchFamily="18" charset="0"/>
                 <a:cs typeface="Times New Roman" pitchFamily="18" charset="0"/>
               </a:rPr>
-              <a:t> </a:t>
+              <a:t>(</a:t>
             </a:r>
             <a:r>
               <a:rPr lang="en-US" sz="1600" dirty="0" err="1" smtClean="0">
                 <a:latin typeface="Times New Roman" pitchFamily="18" charset="0"/>
                 <a:cs typeface="Times New Roman" pitchFamily="18" charset="0"/>
               </a:rPr>
-              <a:t>Thuật</a:t>
+              <a:t>Convolutional</a:t>
             </a:r>
             <a:r>
               <a:rPr lang="en-US" sz="1600" dirty="0" smtClean="0">
                 <a:latin typeface="Times New Roman" pitchFamily="18" charset="0"/>
                 <a:cs typeface="Times New Roman" pitchFamily="18" charset="0"/>
               </a:rPr>
-              <a:t> </a:t>
+              <a:t> Neural Network) </a:t>
             </a:r>
             <a:r>
               <a:rPr lang="en-US" sz="1600" dirty="0" err="1" smtClean="0">
                 <a:latin typeface="Times New Roman" pitchFamily="18" charset="0"/>
                 <a:cs typeface="Times New Roman" pitchFamily="18" charset="0"/>
               </a:rPr>
-              <a:t>toán</a:t>
+              <a:t>nhận</a:t>
             </a:r>
             <a:r>
               <a:rPr lang="en-US" sz="1600" dirty="0" smtClean="0">
                 <a:latin typeface="Times New Roman" pitchFamily="18" charset="0"/>
                 <a:cs typeface="Times New Roman" pitchFamily="18" charset="0"/>
               </a:rPr>
-              <a:t> CNN (</a:t>
+              <a:t> </a:t>
             </a:r>
             <a:r>
               <a:rPr lang="en-US" sz="1600" dirty="0" err="1" smtClean="0">
                 <a:latin typeface="Times New Roman" pitchFamily="18" charset="0"/>
                 <a:cs typeface="Times New Roman" pitchFamily="18" charset="0"/>
               </a:rPr>
-              <a:t>Convolutional</a:t>
+              <a:t>diện</a:t>
             </a:r>
             <a:r>
               <a:rPr lang="en-US" sz="1600" dirty="0" smtClean="0">
                 <a:latin typeface="Times New Roman" pitchFamily="18" charset="0"/>
                 <a:cs typeface="Times New Roman" pitchFamily="18" charset="0"/>
               </a:rPr>
-              <a:t> Neural Network) </a:t>
+              <a:t> </a:t>
             </a:r>
             <a:r>
               <a:rPr lang="en-US" sz="1600" dirty="0" err="1" smtClean="0">
                 <a:latin typeface="Times New Roman" pitchFamily="18" charset="0"/>
                 <a:cs typeface="Times New Roman" pitchFamily="18" charset="0"/>
               </a:rPr>
-              <a:t>nhận</a:t>
+              <a:t>khẩu</a:t>
             </a:r>
             <a:r>
               <a:rPr lang="en-US" sz="1600" dirty="0" smtClean="0">
@@ -10767,77 +11112,14 @@
                 <a:latin typeface="Times New Roman" pitchFamily="18" charset="0"/>
                 <a:cs typeface="Times New Roman" pitchFamily="18" charset="0"/>
               </a:rPr>
-              <a:t>diện</a:t>
+              <a:t>trang</a:t>
             </a:r>
             <a:r>
               <a:rPr lang="en-US" sz="1600" dirty="0" smtClean="0">
                 <a:latin typeface="Times New Roman" pitchFamily="18" charset="0"/>
                 <a:cs typeface="Times New Roman" pitchFamily="18" charset="0"/>
               </a:rPr>
-              <a:t> </a:t>
-            </a:r>
-            <a:r>
-              <a:rPr lang="en-US" sz="1600" dirty="0" err="1" smtClean="0">
-                <a:latin typeface="Times New Roman" pitchFamily="18" charset="0"/>
-                <a:cs typeface="Times New Roman" pitchFamily="18" charset="0"/>
-              </a:rPr>
-              <a:t>khẩu</a:t>
-            </a:r>
-            <a:r>
-              <a:rPr lang="en-US" sz="1600" dirty="0" smtClean="0">
-                <a:latin typeface="Times New Roman" pitchFamily="18" charset="0"/>
-                <a:cs typeface="Times New Roman" pitchFamily="18" charset="0"/>
-              </a:rPr>
-              <a:t> </a:t>
-            </a:r>
-            <a:r>
-              <a:rPr lang="en-US" sz="1600" dirty="0" err="1" smtClean="0">
-                <a:latin typeface="Times New Roman" pitchFamily="18" charset="0"/>
-                <a:cs typeface="Times New Roman" pitchFamily="18" charset="0"/>
-              </a:rPr>
-              <a:t>trang</a:t>
-            </a:r>
-            <a:r>
-              <a:rPr lang="en-US" sz="1600" dirty="0" smtClean="0">
-                <a:latin typeface="Times New Roman" pitchFamily="18" charset="0"/>
-                <a:cs typeface="Times New Roman" pitchFamily="18" charset="0"/>
-              </a:rPr>
-              <a:t> </a:t>
-            </a:r>
-            <a:r>
-              <a:rPr lang="en-US" sz="1600" dirty="0" err="1" smtClean="0">
-                <a:latin typeface="Times New Roman" pitchFamily="18" charset="0"/>
-                <a:cs typeface="Times New Roman" pitchFamily="18" charset="0"/>
-              </a:rPr>
-              <a:t>từ</a:t>
-            </a:r>
-            <a:r>
-              <a:rPr lang="en-US" sz="1600" dirty="0" smtClean="0">
-                <a:latin typeface="Times New Roman" pitchFamily="18" charset="0"/>
-                <a:cs typeface="Times New Roman" pitchFamily="18" charset="0"/>
-              </a:rPr>
-              <a:t> </a:t>
-            </a:r>
-            <a:r>
-              <a:rPr lang="en-US" sz="1600" dirty="0" err="1" smtClean="0">
-                <a:latin typeface="Times New Roman" pitchFamily="18" charset="0"/>
-                <a:cs typeface="Times New Roman" pitchFamily="18" charset="0"/>
-              </a:rPr>
-              <a:t>gương</a:t>
-            </a:r>
-            <a:r>
-              <a:rPr lang="en-US" sz="1600" dirty="0" smtClean="0">
-                <a:latin typeface="Times New Roman" pitchFamily="18" charset="0"/>
-                <a:cs typeface="Times New Roman" pitchFamily="18" charset="0"/>
-              </a:rPr>
-              <a:t> </a:t>
-            </a:r>
-            <a:r>
-              <a:rPr lang="en-US" sz="1600" dirty="0" err="1" smtClean="0">
-                <a:latin typeface="Times New Roman" pitchFamily="18" charset="0"/>
-                <a:cs typeface="Times New Roman" pitchFamily="18" charset="0"/>
-              </a:rPr>
-              <a:t>mặt</a:t>
+              <a:t>.</a:t>
             </a:r>
             <a:endParaRPr sz="1600" dirty="0">
               <a:latin typeface="Times New Roman" pitchFamily="18" charset="0"/>
@@ -10857,10 +11139,6 @@
           </p:nvPr>
         </p:nvSpPr>
         <p:spPr>
-          <a:xfrm>
-            <a:off x="8480584" y="4749851"/>
-            <a:ext cx="548700" cy="393600"/>
-          </a:xfrm>
           <a:prstGeom prst="rect">
             <a:avLst/>
           </a:prstGeom>
@@ -10914,7 +11192,7 @@
         </p:blipFill>
         <p:spPr bwMode="auto">
           <a:xfrm>
-            <a:off x="2971800" y="1276350"/>
+            <a:off x="1295400" y="1276350"/>
             <a:ext cx="2133600" cy="1524000"/>
           </a:xfrm>
           <a:prstGeom prst="rect">
@@ -10984,6 +11262,156 @@
           </a:sp3d>
         </p:spPr>
       </p:pic>
+      <p:sp>
+        <p:nvSpPr>
+          <p:cNvPr id="7" name="Oval 6"/>
+          <p:cNvSpPr/>
+          <p:nvPr/>
+        </p:nvSpPr>
+        <p:spPr>
+          <a:xfrm>
+            <a:off x="4953000" y="742950"/>
+            <a:ext cx="1066800" cy="914400"/>
+          </a:xfrm>
+          <a:prstGeom prst="ellipse">
+            <a:avLst/>
+          </a:prstGeom>
+        </p:spPr>
+        <p:style>
+          <a:lnRef idx="1">
+            <a:schemeClr val="accent3"/>
+          </a:lnRef>
+          <a:fillRef idx="3">
+            <a:schemeClr val="accent3"/>
+          </a:fillRef>
+          <a:effectRef idx="2">
+            <a:schemeClr val="accent3"/>
+          </a:effectRef>
+          <a:fontRef idx="minor">
+            <a:schemeClr val="lt1"/>
+          </a:fontRef>
+        </p:style>
+        <p:txBody>
+          <a:bodyPr rtlCol="0" anchor="ctr"/>
+          <a:lstStyle/>
+          <a:p>
+            <a:pPr algn="ctr"/>
+            <a:r>
+              <a:rPr lang="en-US" dirty="0" smtClean="0">
+                <a:solidFill>
+                  <a:schemeClr val="tx1"/>
+                </a:solidFill>
+              </a:rPr>
+              <a:t>1916 mask</a:t>
+            </a:r>
+            <a:endParaRPr lang="en-US" dirty="0">
+              <a:solidFill>
+                <a:schemeClr val="tx1"/>
+              </a:solidFill>
+            </a:endParaRPr>
+          </a:p>
+        </p:txBody>
+      </p:sp>
+      <p:sp>
+        <p:nvSpPr>
+          <p:cNvPr id="8" name="Oval 7"/>
+          <p:cNvSpPr/>
+          <p:nvPr/>
+        </p:nvSpPr>
+        <p:spPr>
+          <a:xfrm>
+            <a:off x="6477000" y="819150"/>
+            <a:ext cx="1066800" cy="914400"/>
+          </a:xfrm>
+          <a:prstGeom prst="ellipse">
+            <a:avLst/>
+          </a:prstGeom>
+        </p:spPr>
+        <p:style>
+          <a:lnRef idx="1">
+            <a:schemeClr val="accent3"/>
+          </a:lnRef>
+          <a:fillRef idx="3">
+            <a:schemeClr val="accent3"/>
+          </a:fillRef>
+          <a:effectRef idx="2">
+            <a:schemeClr val="accent3"/>
+          </a:effectRef>
+          <a:fontRef idx="minor">
+            <a:schemeClr val="lt1"/>
+          </a:fontRef>
+        </p:style>
+        <p:txBody>
+          <a:bodyPr rtlCol="0" anchor="ctr"/>
+          <a:lstStyle/>
+          <a:p>
+            <a:pPr algn="ctr"/>
+            <a:r>
+              <a:rPr lang="en-US" dirty="0" smtClean="0">
+                <a:solidFill>
+                  <a:schemeClr val="tx1"/>
+                </a:solidFill>
+              </a:rPr>
+              <a:t>1916 without mask</a:t>
+            </a:r>
+            <a:endParaRPr lang="en-US" dirty="0">
+              <a:solidFill>
+                <a:schemeClr val="tx1"/>
+              </a:solidFill>
+            </a:endParaRPr>
+          </a:p>
+        </p:txBody>
+      </p:sp>
+      <p:sp>
+        <p:nvSpPr>
+          <p:cNvPr id="9" name="Oval 8"/>
+          <p:cNvSpPr/>
+          <p:nvPr/>
+        </p:nvSpPr>
+        <p:spPr>
+          <a:xfrm>
+            <a:off x="5410200" y="1581150"/>
+            <a:ext cx="1600200" cy="914400"/>
+          </a:xfrm>
+          <a:prstGeom prst="ellipse">
+            <a:avLst/>
+          </a:prstGeom>
+        </p:spPr>
+        <p:style>
+          <a:lnRef idx="3">
+            <a:schemeClr val="lt1"/>
+          </a:lnRef>
+          <a:fillRef idx="1">
+            <a:schemeClr val="accent1"/>
+          </a:fillRef>
+          <a:effectRef idx="1">
+            <a:schemeClr val="accent1"/>
+          </a:effectRef>
+          <a:fontRef idx="minor">
+            <a:schemeClr val="lt1"/>
+          </a:fontRef>
+        </p:style>
+        <p:txBody>
+          <a:bodyPr rtlCol="0" anchor="ctr"/>
+          <a:lstStyle/>
+          <a:p>
+            <a:pPr algn="ctr"/>
+            <a:r>
+              <a:rPr lang="en-US" dirty="0" smtClean="0">
+                <a:solidFill>
+                  <a:schemeClr val="tx1"/>
+                </a:solidFill>
+              </a:rPr>
+              <a:t>Dataset</a:t>
+            </a:r>
+            <a:endParaRPr lang="en-US" dirty="0">
+              <a:solidFill>
+                <a:schemeClr val="tx1"/>
+              </a:solidFill>
+            </a:endParaRPr>
+          </a:p>
+        </p:txBody>
+      </p:sp>
     </p:spTree>
   </p:cSld>
   <p:clrMapOvr>
@@ -11601,12 +12029,9 @@
           <a:p>
             <a:r>
               <a:rPr lang="vi-VN" sz="1600" dirty="0" smtClean="0">
-                <a:solidFill>
-                  <a:schemeClr val="tx1"/>
-                </a:solidFill>
                 <a:latin typeface="+mj-lt"/>
               </a:rPr>
-              <a:t>Arduino giống như một máy tính nhỏ để người dùng có thể lập trình và thực hiện các dự án điện tử mà không cần phải có các công cụ chuyên biệt để phục vụ việc nạp code.</a:t>
+              <a:t>Phần cứng Arduino (các board mạch vi xử lý) được sinh ra tại thị trấn Ivrea ở Ý, nhằm xây dựng các ứng dụng tương tác với nhau hoặc với môi trường được thuận lợi hơn.</a:t>
             </a:r>
             <a:endParaRPr lang="en-US" sz="1600" dirty="0">
               <a:solidFill>
@@ -11978,8 +12403,8 @@
         </p:nvSpPr>
         <p:spPr>
           <a:xfrm>
-            <a:off x="1447800" y="2933700"/>
-            <a:ext cx="990600" cy="762000"/>
+            <a:off x="1219200" y="2933700"/>
+            <a:ext cx="1219200" cy="1009650"/>
           </a:xfrm>
           <a:prstGeom prst="ellipse">
             <a:avLst/>
@@ -12089,8 +12514,8 @@
         </p:nvCxnSpPr>
         <p:spPr>
           <a:xfrm flipV="1">
-            <a:off x="1943100" y="2343150"/>
-            <a:ext cx="1257300" cy="590550"/>
+            <a:off x="1828800" y="2343150"/>
+            <a:ext cx="1371600" cy="590550"/>
           </a:xfrm>
           <a:prstGeom prst="straightConnector1">
             <a:avLst/>
@@ -12489,8 +12914,8 @@
         </p:nvCxnSpPr>
         <p:spPr>
           <a:xfrm flipH="1">
-            <a:off x="1943100" y="2343150"/>
-            <a:ext cx="1257300" cy="590550"/>
+            <a:off x="1828800" y="2343150"/>
+            <a:ext cx="1371600" cy="590550"/>
           </a:xfrm>
           <a:prstGeom prst="straightConnector1">
             <a:avLst/>

</xml_diff>